<commit_message>
updated Windows Azure Compute deck
</commit_message>
<xml_diff>
--- a/DebuggingAndTroubleshootingWindowsAzureApplications/DebuggingAndTroubleshootingWindowsAzureApplications.pptx
+++ b/DebuggingAndTroubleshootingWindowsAzureApplications/DebuggingAndTroubleshootingWindowsAzureApplications.pptx
@@ -41,31 +41,32 @@
   <p:notesSz cx="6858000" cy="9144000"/>
   <p:embeddedFontLst>
     <p:embeddedFont>
+      <p:font typeface="Consolas" pitchFamily="49" charset="0"/>
+      <p:regular r:id="rId29"/>
+      <p:bold r:id="rId30"/>
+      <p:italic r:id="rId31"/>
+      <p:boldItalic r:id="rId32"/>
+    </p:embeddedFont>
+    <p:embeddedFont>
       <p:font typeface="Segoe UI Light" pitchFamily="34" charset="0"/>
-      <p:regular r:id="rId29"/>
+      <p:regular r:id="rId33"/>
+      <p:italic r:id="rId34"/>
+    </p:embeddedFont>
+    <p:embeddedFont>
+      <p:font typeface="Segoe Light" charset="0"/>
+      <p:regular r:id="rId35"/>
+      <p:italic r:id="rId36"/>
     </p:embeddedFont>
     <p:embeddedFont>
       <p:font typeface="Segoe UI" pitchFamily="34" charset="0"/>
-      <p:regular r:id="rId30"/>
-      <p:bold r:id="rId31"/>
-      <p:italic r:id="rId32"/>
-      <p:boldItalic r:id="rId33"/>
-    </p:embeddedFont>
-    <p:embeddedFont>
-      <p:font typeface="Consolas" pitchFamily="49" charset="0"/>
-      <p:regular r:id="rId34"/>
-      <p:bold r:id="rId35"/>
-      <p:italic r:id="rId36"/>
-      <p:boldItalic r:id="rId37"/>
-    </p:embeddedFont>
-    <p:embeddedFont>
-      <p:font typeface="Segoe Light" pitchFamily="34" charset="0"/>
-      <p:regular r:id="rId38"/>
+      <p:regular r:id="rId37"/>
+      <p:bold r:id="rId38"/>
       <p:italic r:id="rId39"/>
+      <p:boldItalic r:id="rId40"/>
     </p:embeddedFont>
   </p:embeddedFontLst>
   <p:custDataLst>
-    <p:tags r:id="rId40"/>
+    <p:tags r:id="rId41"/>
   </p:custDataLst>
   <p:defaultTextStyle>
     <a:defPPr>
@@ -253,7 +254,7 @@
                 <a:latin typeface="Segoe UI" pitchFamily="34" charset="0"/>
               </a:rPr>
               <a:pPr/>
-              <a:t>12/10/2011</a:t>
+              <a:t>6/12/2012</a:t>
             </a:fld>
             <a:endParaRPr lang="en-US" dirty="0">
               <a:latin typeface="Segoe UI" pitchFamily="34" charset="0"/>
@@ -466,7 +467,7 @@
             <a:fld id="{7C3FBCD4-166E-446F-AF18-7D4A0CF9AEF6}" type="datetimeFigureOut">
               <a:rPr lang="en-US" smtClean="0"/>
               <a:pPr/>
-              <a:t>12/10/2011</a:t>
+              <a:t>6/12/2012</a:t>
             </a:fld>
             <a:endParaRPr lang="en-US" dirty="0"/>
           </a:p>
@@ -27606,7 +27607,7 @@
           <a:graphicData uri="http://schemas.openxmlformats.org/presentationml/2006/ole">
             <mc:AlternateContent xmlns:mc="http://schemas.openxmlformats.org/markup-compatibility/2006">
               <mc:Choice xmlns:v="urn:schemas-microsoft-com:vml" Requires="v">
-                <p:oleObj spid="_x0000_s50198" name="think-cell Slide" r:id="rId12" imgW="270" imgH="270" progId="TCLayout.ActiveDocument.1">
+                <p:oleObj spid="_x0000_s50199" name="think-cell Slide" r:id="rId12" imgW="270" imgH="270" progId="TCLayout.ActiveDocument.1">
                   <p:embed/>
                 </p:oleObj>
               </mc:Choice>
@@ -32998,154 +32999,6 @@
           </p:txBody>
         </p:sp>
       </p:grpSp>
-      <p:grpSp>
-        <p:nvGrpSpPr>
-          <p:cNvPr id="6" name="Group 5"/>
-          <p:cNvGrpSpPr/>
-          <p:nvPr/>
-        </p:nvGrpSpPr>
-        <p:grpSpPr>
-          <a:xfrm>
-            <a:off x="6492732" y="2319362"/>
-            <a:ext cx="5696093" cy="4538638"/>
-            <a:chOff x="6492732" y="2319362"/>
-            <a:chExt cx="5696093" cy="4538638"/>
-          </a:xfrm>
-        </p:grpSpPr>
-        <p:sp>
-          <p:nvSpPr>
-            <p:cNvPr id="5" name="Rectangle 4"/>
-            <p:cNvSpPr/>
-            <p:nvPr/>
-          </p:nvSpPr>
-          <p:spPr bwMode="auto">
-            <a:xfrm>
-              <a:off x="6492732" y="3515710"/>
-              <a:ext cx="5696093" cy="3342290"/>
-            </a:xfrm>
-            <a:prstGeom prst="rect">
-              <a:avLst/>
-            </a:prstGeom>
-            <a:solidFill>
-              <a:schemeClr val="bg1">
-                <a:lumMod val="95000"/>
-              </a:schemeClr>
-            </a:solidFill>
-            <a:ln>
-              <a:noFill/>
-              <a:headEnd type="none" w="med" len="med"/>
-              <a:tailEnd type="none" w="med" len="med"/>
-            </a:ln>
-            <a:effectLst/>
-          </p:spPr>
-          <p:style>
-            <a:lnRef idx="1">
-              <a:schemeClr val="accent2"/>
-            </a:lnRef>
-            <a:fillRef idx="3">
-              <a:schemeClr val="accent2"/>
-            </a:fillRef>
-            <a:effectRef idx="2">
-              <a:schemeClr val="accent2"/>
-            </a:effectRef>
-            <a:fontRef idx="minor">
-              <a:schemeClr val="lt1"/>
-            </a:fontRef>
-          </p:style>
-          <p:txBody>
-            <a:bodyPr vert="horz" wrap="square" lIns="91436" tIns="45718" rIns="91436" bIns="45718" numCol="1" rtlCol="0" anchor="ctr" anchorCtr="0" compatLnSpc="1">
-              <a:prstTxWarp prst="textNoShape">
-                <a:avLst/>
-              </a:prstTxWarp>
-            </a:bodyPr>
-            <a:lstStyle/>
-            <a:p>
-              <a:pPr algn="ctr" defTabSz="914099" fontAlgn="base">
-                <a:spcBef>
-                  <a:spcPts val="200"/>
-                </a:spcBef>
-                <a:spcAft>
-                  <a:spcPct val="0"/>
-                </a:spcAft>
-              </a:pPr>
-              <a:endParaRPr lang="en-US" sz="2800" dirty="0" smtClean="0">
-                <a:ln>
-                  <a:solidFill>
-                    <a:schemeClr val="bg1">
-                      <a:alpha val="0"/>
-                    </a:schemeClr>
-                  </a:solidFill>
-                </a:ln>
-                <a:solidFill>
-                  <a:schemeClr val="bg1"/>
-                </a:solidFill>
-              </a:endParaRPr>
-            </a:p>
-          </p:txBody>
-        </p:sp>
-        <p:pic>
-          <p:nvPicPr>
-            <p:cNvPr id="4" name="Picture 2"/>
-            <p:cNvPicPr>
-              <a:picLocks noChangeAspect="1" noChangeArrowheads="1"/>
-            </p:cNvPicPr>
-            <p:nvPr/>
-          </p:nvPicPr>
-          <p:blipFill>
-            <a:blip r:embed="rId3">
-              <a:extLst>
-                <a:ext uri="{28A0092B-C50C-407E-A947-70E740481C1C}">
-                  <a14:useLocalDpi xmlns:a14="http://schemas.microsoft.com/office/drawing/2010/main" val="0"/>
-                </a:ext>
-              </a:extLst>
-            </a:blip>
-            <a:stretch>
-              <a:fillRect/>
-            </a:stretch>
-          </p:blipFill>
-          <p:spPr bwMode="auto">
-            <a:xfrm>
-              <a:off x="6492732" y="2319362"/>
-              <a:ext cx="5696092" cy="1338238"/>
-            </a:xfrm>
-            <a:prstGeom prst="rect">
-              <a:avLst/>
-            </a:prstGeom>
-            <a:noFill/>
-            <a:ln>
-              <a:noFill/>
-            </a:ln>
-            <a:extLst>
-              <a:ext uri="{909E8E84-426E-40DD-AFC4-6F175D3DCCD1}">
-                <a14:hiddenFill xmlns:a14="http://schemas.microsoft.com/office/drawing/2010/main">
-                  <a:solidFill>
-                    <a:schemeClr val="accent1"/>
-                  </a:solidFill>
-                </a14:hiddenFill>
-              </a:ext>
-              <a:ext uri="{91240B29-F687-4F45-9708-019B960494DF}">
-                <a14:hiddenLine xmlns:a14="http://schemas.microsoft.com/office/drawing/2010/main" w="9525">
-                  <a:solidFill>
-                    <a:schemeClr val="tx1"/>
-                  </a:solidFill>
-                  <a:miter lim="800000"/>
-                  <a:headEnd/>
-                  <a:tailEnd/>
-                </a14:hiddenLine>
-              </a:ext>
-              <a:ext uri="{AF507438-7753-43E0-B8FC-AC1667EBCBE1}">
-                <a14:hiddenEffects xmlns:a14="http://schemas.microsoft.com/office/drawing/2010/main">
-                  <a:effectLst>
-                    <a:outerShdw dist="35921" dir="2700000" algn="ctr" rotWithShape="0">
-                      <a:schemeClr val="bg2"/>
-                    </a:outerShdw>
-                  </a:effectLst>
-                </a14:hiddenEffects>
-              </a:ext>
-            </a:extLst>
-          </p:spPr>
-        </p:pic>
-      </p:grpSp>
       <p:sp>
         <p:nvSpPr>
           <p:cNvPr id="2" name="Title 1"/>
@@ -33288,6 +33141,70 @@
           </a:p>
         </p:txBody>
       </p:sp>
+      <p:pic>
+        <p:nvPicPr>
+          <p:cNvPr id="51203" name="Picture 3"/>
+          <p:cNvPicPr>
+            <a:picLocks noChangeAspect="1" noChangeArrowheads="1"/>
+          </p:cNvPicPr>
+          <p:nvPr/>
+        </p:nvPicPr>
+        <p:blipFill>
+          <a:blip r:embed="rId3">
+            <a:extLst>
+              <a:ext uri="{28A0092B-C50C-407E-A947-70E740481C1C}">
+                <a14:useLocalDpi xmlns:a14="http://schemas.microsoft.com/office/drawing/2010/main" val="0"/>
+              </a:ext>
+            </a:extLst>
+          </a:blip>
+          <a:srcRect/>
+          <a:stretch>
+            <a:fillRect/>
+          </a:stretch>
+        </p:blipFill>
+        <p:spPr bwMode="auto">
+          <a:xfrm>
+            <a:off x="6513510" y="2427888"/>
+            <a:ext cx="5412751" cy="1974323"/>
+          </a:xfrm>
+          <a:prstGeom prst="rect">
+            <a:avLst/>
+          </a:prstGeom>
+          <a:noFill/>
+          <a:ln>
+            <a:noFill/>
+          </a:ln>
+          <a:effectLst/>
+          <a:extLst>
+            <a:ext uri="{909E8E84-426E-40DD-AFC4-6F175D3DCCD1}">
+              <a14:hiddenFill xmlns:a14="http://schemas.microsoft.com/office/drawing/2010/main">
+                <a:solidFill>
+                  <a:schemeClr val="accent1"/>
+                </a:solidFill>
+              </a14:hiddenFill>
+            </a:ext>
+            <a:ext uri="{91240B29-F687-4F45-9708-019B960494DF}">
+              <a14:hiddenLine xmlns:a14="http://schemas.microsoft.com/office/drawing/2010/main" w="9525">
+                <a:solidFill>
+                  <a:schemeClr val="tx1"/>
+                </a:solidFill>
+                <a:miter lim="800000"/>
+                <a:headEnd/>
+                <a:tailEnd/>
+              </a14:hiddenLine>
+            </a:ext>
+            <a:ext uri="{AF507438-7753-43E0-B8FC-AC1667EBCBE1}">
+              <a14:hiddenEffects xmlns:a14="http://schemas.microsoft.com/office/drawing/2010/main">
+                <a:effectLst>
+                  <a:outerShdw dist="35921" dir="2700000" algn="ctr" rotWithShape="0">
+                    <a:schemeClr val="bg2"/>
+                  </a:outerShdw>
+                </a:effectLst>
+              </a14:hiddenEffects>
+            </a:ext>
+          </a:extLst>
+        </p:spPr>
+      </p:pic>
     </p:spTree>
     <p:extLst>
       <p:ext uri="{BB962C8B-B14F-4D97-AF65-F5344CB8AC3E}">

</xml_diff>